<commit_message>
updating some links and references on the Getting Started / About page
</commit_message>
<xml_diff>
--- a/src/public/docs/geomeWorkflow.pptx
+++ b/src/public/docs/geomeWorkflow.pptx
@@ -241,7 +241,7 @@
           <a:p>
             <a:fld id="{FF6C7326-2AF8-734F-A684-D3076EFEC837}" type="datetimeFigureOut">
               <a:rPr lang="en-US" smtClean="0"/>
-              <a:t>9/11/18</a:t>
+              <a:t>9/17/19</a:t>
             </a:fld>
             <a:endParaRPr lang="en-US"/>
           </a:p>
@@ -409,7 +409,7 @@
           <a:p>
             <a:fld id="{FF6C7326-2AF8-734F-A684-D3076EFEC837}" type="datetimeFigureOut">
               <a:rPr lang="en-US" smtClean="0"/>
-              <a:t>9/11/18</a:t>
+              <a:t>9/17/19</a:t>
             </a:fld>
             <a:endParaRPr lang="en-US"/>
           </a:p>
@@ -587,7 +587,7 @@
           <a:p>
             <a:fld id="{FF6C7326-2AF8-734F-A684-D3076EFEC837}" type="datetimeFigureOut">
               <a:rPr lang="en-US" smtClean="0"/>
-              <a:t>9/11/18</a:t>
+              <a:t>9/17/19</a:t>
             </a:fld>
             <a:endParaRPr lang="en-US"/>
           </a:p>
@@ -755,7 +755,7 @@
           <a:p>
             <a:fld id="{FF6C7326-2AF8-734F-A684-D3076EFEC837}" type="datetimeFigureOut">
               <a:rPr lang="en-US" smtClean="0"/>
-              <a:t>9/11/18</a:t>
+              <a:t>9/17/19</a:t>
             </a:fld>
             <a:endParaRPr lang="en-US"/>
           </a:p>
@@ -1000,7 +1000,7 @@
           <a:p>
             <a:fld id="{FF6C7326-2AF8-734F-A684-D3076EFEC837}" type="datetimeFigureOut">
               <a:rPr lang="en-US" smtClean="0"/>
-              <a:t>9/11/18</a:t>
+              <a:t>9/17/19</a:t>
             </a:fld>
             <a:endParaRPr lang="en-US"/>
           </a:p>
@@ -1229,7 +1229,7 @@
           <a:p>
             <a:fld id="{FF6C7326-2AF8-734F-A684-D3076EFEC837}" type="datetimeFigureOut">
               <a:rPr lang="en-US" smtClean="0"/>
-              <a:t>9/11/18</a:t>
+              <a:t>9/17/19</a:t>
             </a:fld>
             <a:endParaRPr lang="en-US"/>
           </a:p>
@@ -1593,7 +1593,7 @@
           <a:p>
             <a:fld id="{FF6C7326-2AF8-734F-A684-D3076EFEC837}" type="datetimeFigureOut">
               <a:rPr lang="en-US" smtClean="0"/>
-              <a:t>9/11/18</a:t>
+              <a:t>9/17/19</a:t>
             </a:fld>
             <a:endParaRPr lang="en-US"/>
           </a:p>
@@ -1710,7 +1710,7 @@
           <a:p>
             <a:fld id="{FF6C7326-2AF8-734F-A684-D3076EFEC837}" type="datetimeFigureOut">
               <a:rPr lang="en-US" smtClean="0"/>
-              <a:t>9/11/18</a:t>
+              <a:t>9/17/19</a:t>
             </a:fld>
             <a:endParaRPr lang="en-US"/>
           </a:p>
@@ -1805,7 +1805,7 @@
           <a:p>
             <a:fld id="{FF6C7326-2AF8-734F-A684-D3076EFEC837}" type="datetimeFigureOut">
               <a:rPr lang="en-US" smtClean="0"/>
-              <a:t>9/11/18</a:t>
+              <a:t>9/17/19</a:t>
             </a:fld>
             <a:endParaRPr lang="en-US"/>
           </a:p>
@@ -2080,7 +2080,7 @@
           <a:p>
             <a:fld id="{FF6C7326-2AF8-734F-A684-D3076EFEC837}" type="datetimeFigureOut">
               <a:rPr lang="en-US" smtClean="0"/>
-              <a:t>9/11/18</a:t>
+              <a:t>9/17/19</a:t>
             </a:fld>
             <a:endParaRPr lang="en-US"/>
           </a:p>
@@ -2332,7 +2332,7 @@
           <a:p>
             <a:fld id="{FF6C7326-2AF8-734F-A684-D3076EFEC837}" type="datetimeFigureOut">
               <a:rPr lang="en-US" smtClean="0"/>
-              <a:t>9/11/18</a:t>
+              <a:t>9/17/19</a:t>
             </a:fld>
             <a:endParaRPr lang="en-US"/>
           </a:p>
@@ -2543,7 +2543,7 @@
           <a:p>
             <a:fld id="{FF6C7326-2AF8-734F-A684-D3076EFEC837}" type="datetimeFigureOut">
               <a:rPr lang="en-US" smtClean="0"/>
-              <a:t>9/11/18</a:t>
+              <a:t>9/17/19</a:t>
             </a:fld>
             <a:endParaRPr lang="en-US"/>
           </a:p>
@@ -3375,7 +3375,7 @@
         </p:nvSpPr>
         <p:spPr>
           <a:xfrm>
-            <a:off x="4936903" y="258843"/>
+            <a:off x="4758200" y="365541"/>
             <a:ext cx="3433924" cy="584775"/>
           </a:xfrm>
           <a:prstGeom prst="rect">
@@ -3390,16 +3390,10 @@
           <a:lstStyle/>
           <a:p>
             <a:r>
-              <a:rPr lang="en-US" sz="3200" b="1" dirty="0" err="1">
-                <a:latin typeface="+mj-lt"/>
-              </a:rPr>
-              <a:t>GeOMe</a:t>
-            </a:r>
-            <a:r>
               <a:rPr lang="en-US" sz="3200" b="1" dirty="0">
                 <a:latin typeface="+mj-lt"/>
               </a:rPr>
-              <a:t> Workflow</a:t>
+              <a:t>Workflow</a:t>
             </a:r>
           </a:p>
         </p:txBody>
@@ -3412,12 +3406,15 @@
         </p:nvSpPr>
         <p:spPr>
           <a:xfrm>
-            <a:off x="9661614" y="4924151"/>
+            <a:off x="9717684" y="4489851"/>
             <a:ext cx="2145233" cy="900268"/>
           </a:xfrm>
           <a:prstGeom prst="roundRect">
             <a:avLst/>
           </a:prstGeom>
+          <a:ln>
+            <a:prstDash val="sysDash"/>
+          </a:ln>
         </p:spPr>
         <p:style>
           <a:lnRef idx="2">
@@ -3583,8 +3580,8 @@
         </p:nvCxnSpPr>
         <p:spPr>
           <a:xfrm rot="16200000" flipH="1">
-            <a:off x="8251397" y="2441316"/>
-            <a:ext cx="898003" cy="4067666"/>
+            <a:off x="8496582" y="2196131"/>
+            <a:ext cx="463703" cy="4123736"/>
           </a:xfrm>
           <a:prstGeom prst="curvedConnector3">
             <a:avLst>
@@ -3595,6 +3592,7 @@
             <a:solidFill>
               <a:schemeClr val="tx1"/>
             </a:solidFill>
+            <a:prstDash val="sysDash"/>
             <a:tailEnd type="triangle" w="lg" len="lg"/>
           </a:ln>
         </p:spPr>
@@ -3746,35 +3744,6 @@
             <a:r>
               <a:rPr lang="en-US" i="1" dirty="0"/>
               <a:t>Accession ID Harvest</a:t>
-            </a:r>
-          </a:p>
-        </p:txBody>
-      </p:sp>
-      <p:sp>
-        <p:nvSpPr>
-          <p:cNvPr id="109" name="TextBox 108"/>
-          <p:cNvSpPr txBox="1"/>
-          <p:nvPr/>
-        </p:nvSpPr>
-        <p:spPr>
-          <a:xfrm>
-            <a:off x="7639505" y="4482102"/>
-            <a:ext cx="2319609" cy="369332"/>
-          </a:xfrm>
-          <a:prstGeom prst="rect">
-            <a:avLst/>
-          </a:prstGeom>
-          <a:noFill/>
-        </p:spPr>
-        <p:txBody>
-          <a:bodyPr wrap="square" rtlCol="0">
-            <a:spAutoFit/>
-          </a:bodyPr>
-          <a:lstStyle/>
-          <a:p>
-            <a:r>
-              <a:rPr lang="en-US" i="1" dirty="0"/>
-              <a:t>Automated submission</a:t>
             </a:r>
           </a:p>
         </p:txBody>
@@ -4295,12 +4264,143 @@
           </a:fontRef>
         </p:style>
       </p:cxnSp>
+      <p:sp>
+        <p:nvSpPr>
+          <p:cNvPr id="38" name="Rounded Rectangle 37">
+            <a:extLst>
+              <a:ext uri="{FF2B5EF4-FFF2-40B4-BE49-F238E27FC236}">
+                <a16:creationId xmlns:a16="http://schemas.microsoft.com/office/drawing/2014/main" id="{5CF8FC5B-AC2D-A440-96B7-9CA4BA8DC778}"/>
+              </a:ext>
+            </a:extLst>
+          </p:cNvPr>
+          <p:cNvSpPr/>
+          <p:nvPr/>
+        </p:nvSpPr>
+        <p:spPr>
+          <a:xfrm>
+            <a:off x="9717684" y="5569890"/>
+            <a:ext cx="2145233" cy="900268"/>
+          </a:xfrm>
+          <a:prstGeom prst="roundRect">
+            <a:avLst/>
+          </a:prstGeom>
+          <a:ln>
+            <a:prstDash val="sysDash"/>
+          </a:ln>
+        </p:spPr>
+        <p:style>
+          <a:lnRef idx="2">
+            <a:schemeClr val="accent6"/>
+          </a:lnRef>
+          <a:fillRef idx="1">
+            <a:schemeClr val="lt1"/>
+          </a:fillRef>
+          <a:effectRef idx="0">
+            <a:schemeClr val="accent6"/>
+          </a:effectRef>
+          <a:fontRef idx="minor">
+            <a:schemeClr val="dk1"/>
+          </a:fontRef>
+        </p:style>
+        <p:txBody>
+          <a:bodyPr rtlCol="0" anchor="ctr"/>
+          <a:lstStyle/>
+          <a:p>
+            <a:pPr algn="ctr"/>
+            <a:r>
+              <a:rPr lang="en-US" dirty="0"/>
+              <a:t>Barcode of Life Database (BOLD)</a:t>
+            </a:r>
+          </a:p>
+        </p:txBody>
+      </p:sp>
+      <p:cxnSp>
+        <p:nvCxnSpPr>
+          <p:cNvPr id="42" name="Curved Connector 41">
+            <a:extLst>
+              <a:ext uri="{FF2B5EF4-FFF2-40B4-BE49-F238E27FC236}">
+                <a16:creationId xmlns:a16="http://schemas.microsoft.com/office/drawing/2014/main" id="{AE055BAF-2756-384B-834A-71FAD9926EB6}"/>
+              </a:ext>
+            </a:extLst>
+          </p:cNvPr>
+          <p:cNvCxnSpPr>
+            <a:cxnSpLocks/>
+            <a:stCxn id="6" idx="2"/>
+          </p:cNvCxnSpPr>
+          <p:nvPr/>
+        </p:nvCxnSpPr>
+        <p:spPr>
+          <a:xfrm rot="16200000" flipH="1">
+            <a:off x="7420252" y="3272461"/>
+            <a:ext cx="1543744" cy="3051118"/>
+          </a:xfrm>
+          <a:prstGeom prst="curvedConnector2">
+            <a:avLst/>
+          </a:prstGeom>
+          <a:ln w="25400" cap="rnd">
+            <a:solidFill>
+              <a:schemeClr val="tx1"/>
+            </a:solidFill>
+            <a:prstDash val="sysDash"/>
+            <a:tailEnd type="triangle" w="lg" len="lg"/>
+          </a:ln>
+        </p:spPr>
+        <p:style>
+          <a:lnRef idx="1">
+            <a:schemeClr val="accent1"/>
+          </a:lnRef>
+          <a:fillRef idx="0">
+            <a:schemeClr val="accent1"/>
+          </a:fillRef>
+          <a:effectRef idx="0">
+            <a:schemeClr val="accent1"/>
+          </a:effectRef>
+          <a:fontRef idx="minor">
+            <a:schemeClr val="tx1"/>
+          </a:fontRef>
+        </p:style>
+      </p:cxnSp>
+      <p:sp>
+        <p:nvSpPr>
+          <p:cNvPr id="43" name="TextBox 42">
+            <a:extLst>
+              <a:ext uri="{FF2B5EF4-FFF2-40B4-BE49-F238E27FC236}">
+                <a16:creationId xmlns:a16="http://schemas.microsoft.com/office/drawing/2014/main" id="{D038D4AD-3A28-D047-BA75-76BFBB10B94E}"/>
+              </a:ext>
+            </a:extLst>
+          </p:cNvPr>
+          <p:cNvSpPr txBox="1"/>
+          <p:nvPr/>
+        </p:nvSpPr>
+        <p:spPr>
+          <a:xfrm>
+            <a:off x="7486060" y="4538646"/>
+            <a:ext cx="2319609" cy="369332"/>
+          </a:xfrm>
+          <a:prstGeom prst="rect">
+            <a:avLst/>
+          </a:prstGeom>
+          <a:noFill/>
+        </p:spPr>
+        <p:txBody>
+          <a:bodyPr wrap="square" rtlCol="0">
+            <a:spAutoFit/>
+          </a:bodyPr>
+          <a:lstStyle/>
+          <a:p>
+            <a:r>
+              <a:rPr lang="en-US" i="1" dirty="0"/>
+              <a:t>Optional submissions</a:t>
+            </a:r>
+          </a:p>
+        </p:txBody>
+      </p:sp>
       <p:pic>
         <p:nvPicPr>
-          <p:cNvPr id="126" name="Picture 125">
+          <p:cNvPr id="2" name="Picture 1">
             <a:extLst>
               <a:ext uri="{FF2B5EF4-FFF2-40B4-BE49-F238E27FC236}">
-                <a16:creationId xmlns:a16="http://schemas.microsoft.com/office/drawing/2014/main" id="{04B92F06-BE3D-284F-AB0B-8EB424F28AB0}"/>
+                <a16:creationId xmlns:a16="http://schemas.microsoft.com/office/drawing/2014/main" id="{FEDDF97C-6204-0E44-8130-1199135957A4}"/>
               </a:ext>
             </a:extLst>
           </p:cNvPr>
@@ -4317,8 +4417,8 @@
         </p:blipFill>
         <p:spPr>
           <a:xfrm>
-            <a:off x="9959114" y="195569"/>
-            <a:ext cx="1957055" cy="607936"/>
+            <a:off x="9582444" y="290612"/>
+            <a:ext cx="1968500" cy="609600"/>
           </a:xfrm>
           <a:prstGeom prst="rect">
             <a:avLst/>

</xml_diff>